<commit_message>
Gateway ok (Auth with JWT)
</commit_message>
<xml_diff>
--- a/MSA-HOME-APP.pptx
+++ b/MSA-HOME-APP.pptx
@@ -104,7 +104,24 @@
       </a:defRPr>
     </a:lvl9pPr>
   </p:defaultTextStyle>
+  <p:extLst>
+    <p:ext uri="{EFAFB233-063F-42B5-8137-9DF3F51BA10A}">
+      <p15:sldGuideLst xmlns:p15="http://schemas.microsoft.com/office/powerpoint/2012/main"/>
+    </p:ext>
+  </p:extLst>
 </p:presentation>
+</file>
+
+<file path=ppt/commentAuthors.xml><?xml version="1.0" encoding="utf-8"?>
+<p:cmAuthorLst xmlns:a="http://schemas.openxmlformats.org/drawingml/2006/main" xmlns:r="http://schemas.openxmlformats.org/officeDocument/2006/relationships" xmlns:p="http://schemas.openxmlformats.org/presentationml/2006/main">
+  <p:cmAuthor id="1" name="CHAFIA Youness" initials="CY" lastIdx="1" clrIdx="0">
+    <p:extLst>
+      <p:ext uri="{19B8F6BF-5375-455C-9EA6-DF929625EA0E}">
+        <p15:presenceInfo xmlns:p15="http://schemas.microsoft.com/office/powerpoint/2012/main" userId="S-1-5-21-1390067357-1682526488-682003330-14741" providerId="AD"/>
+      </p:ext>
+    </p:extLst>
+  </p:cmAuthor>
+</p:cmAuthorLst>
 </file>
 
 <file path=ppt/slideLayouts/slideLayout1.xml><?xml version="1.0" encoding="utf-8"?>
@@ -3294,7 +3311,7 @@
         <p:spPr>
           <a:xfrm>
             <a:off x="4428310" y="4935798"/>
-            <a:ext cx="1663337" cy="338554"/>
+            <a:ext cx="1663337" cy="523220"/>
           </a:xfrm>
           <a:prstGeom prst="rect">
             <a:avLst/>
@@ -3310,9 +3327,21 @@
             <a:pPr algn="ctr"/>
             <a:r>
               <a:rPr lang="fr-FR" sz="1600" dirty="0" smtClean="0"/>
-              <a:t>ZUUL-Server</a:t>
-            </a:r>
-            <a:endParaRPr lang="fr-FR" sz="1600" dirty="0"/>
+              <a:t>ZUUL-Server </a:t>
+            </a:r>
+            <a:r>
+              <a:rPr lang="fr-FR" sz="1100" dirty="0" smtClean="0">
+                <a:solidFill>
+                  <a:srgbClr val="FF0000"/>
+                </a:solidFill>
+              </a:rPr>
+              <a:t>port:8080</a:t>
+            </a:r>
+            <a:endParaRPr lang="fr-FR" sz="1100" dirty="0">
+              <a:solidFill>
+                <a:srgbClr val="FF0000"/>
+              </a:solidFill>
+            </a:endParaRPr>
           </a:p>
         </p:txBody>
       </p:sp>
@@ -3799,6 +3828,84 @@
               <a:t>(Angular 8)</a:t>
             </a:r>
             <a:endParaRPr lang="fr-FR" sz="1100" dirty="0"/>
+          </a:p>
+        </p:txBody>
+      </p:sp>
+      <p:sp>
+        <p:nvSpPr>
+          <p:cNvPr id="25" name="ZoneTexte 24"/>
+          <p:cNvSpPr txBox="1"/>
+          <p:nvPr/>
+        </p:nvSpPr>
+        <p:spPr>
+          <a:xfrm>
+            <a:off x="8055430" y="1323350"/>
+            <a:ext cx="1663337" cy="261610"/>
+          </a:xfrm>
+          <a:prstGeom prst="rect">
+            <a:avLst/>
+          </a:prstGeom>
+          <a:noFill/>
+        </p:spPr>
+        <p:txBody>
+          <a:bodyPr wrap="square" rtlCol="0">
+            <a:spAutoFit/>
+          </a:bodyPr>
+          <a:lstStyle/>
+          <a:p>
+            <a:pPr algn="ctr"/>
+            <a:r>
+              <a:rPr lang="fr-FR" sz="1100" dirty="0" smtClean="0">
+                <a:solidFill>
+                  <a:srgbClr val="FF0000"/>
+                </a:solidFill>
+              </a:rPr>
+              <a:t>Port:8090</a:t>
+            </a:r>
+            <a:endParaRPr lang="fr-FR" sz="1600" dirty="0">
+              <a:solidFill>
+                <a:srgbClr val="FF0000"/>
+              </a:solidFill>
+            </a:endParaRPr>
+          </a:p>
+        </p:txBody>
+      </p:sp>
+      <p:sp>
+        <p:nvSpPr>
+          <p:cNvPr id="26" name="ZoneTexte 25"/>
+          <p:cNvSpPr txBox="1"/>
+          <p:nvPr/>
+        </p:nvSpPr>
+        <p:spPr>
+          <a:xfrm>
+            <a:off x="8090261" y="2635242"/>
+            <a:ext cx="1663337" cy="261610"/>
+          </a:xfrm>
+          <a:prstGeom prst="rect">
+            <a:avLst/>
+          </a:prstGeom>
+          <a:noFill/>
+        </p:spPr>
+        <p:txBody>
+          <a:bodyPr wrap="square" rtlCol="0">
+            <a:spAutoFit/>
+          </a:bodyPr>
+          <a:lstStyle/>
+          <a:p>
+            <a:pPr algn="ctr"/>
+            <a:r>
+              <a:rPr lang="fr-FR" sz="1100" dirty="0" smtClean="0">
+                <a:solidFill>
+                  <a:srgbClr val="FF0000"/>
+                </a:solidFill>
+              </a:rPr>
+              <a:t>Port:8070</a:t>
+            </a:r>
+            <a:endParaRPr lang="fr-FR" sz="1600" dirty="0">
+              <a:solidFill>
+                <a:srgbClr val="FF0000"/>
+              </a:solidFill>
+            </a:endParaRPr>
           </a:p>
         </p:txBody>
       </p:sp>

</xml_diff>